<commit_message>
Implement simple observable component
</commit_message>
<xml_diff>
--- a/angular2.pptx
+++ b/angular2.pptx
@@ -9,18 +9,24 @@
     <p:sldId id="266" r:id="rId3"/>
     <p:sldId id="257" r:id="rId4"/>
     <p:sldId id="259" r:id="rId5"/>
-    <p:sldId id="271" r:id="rId6"/>
-    <p:sldId id="258" r:id="rId7"/>
+    <p:sldId id="258" r:id="rId6"/>
+    <p:sldId id="271" r:id="rId7"/>
     <p:sldId id="261" r:id="rId8"/>
     <p:sldId id="262" r:id="rId9"/>
     <p:sldId id="263" r:id="rId10"/>
     <p:sldId id="264" r:id="rId11"/>
     <p:sldId id="265" r:id="rId12"/>
-    <p:sldId id="267" r:id="rId13"/>
-    <p:sldId id="268" r:id="rId14"/>
-    <p:sldId id="269" r:id="rId15"/>
-    <p:sldId id="270" r:id="rId16"/>
-    <p:sldId id="272" r:id="rId17"/>
+    <p:sldId id="273" r:id="rId13"/>
+    <p:sldId id="267" r:id="rId14"/>
+    <p:sldId id="268" r:id="rId15"/>
+    <p:sldId id="269" r:id="rId16"/>
+    <p:sldId id="270" r:id="rId17"/>
+    <p:sldId id="272" r:id="rId18"/>
+    <p:sldId id="274" r:id="rId19"/>
+    <p:sldId id="275" r:id="rId20"/>
+    <p:sldId id="276" r:id="rId21"/>
+    <p:sldId id="278" r:id="rId22"/>
+    <p:sldId id="277" r:id="rId23"/>
   </p:sldIdLst>
   <p:sldSz cx="9144000" cy="6858000" type="screen4x3"/>
   <p:notesSz cx="6858000" cy="9144000"/>
@@ -121,7 +127,7 @@
   </p:defaultTextStyle>
   <p:extLst>
     <p:ext uri="{EFAFB233-063F-42B5-8137-9DF3F51BA10A}">
-      <p15:sldGuideLst xmlns:p15="http://schemas.microsoft.com/office/powerpoint/2012/main">
+      <p15:sldGuideLst xmlns:p15="http://schemas.microsoft.com/office/powerpoint/2012/main" xmlns="">
         <p15:guide id="1" orient="horz" pos="2160">
           <p15:clr>
             <a:srgbClr val="A4A3A4"/>
@@ -319,7 +325,7 @@
           <a:p>
             <a:fld id="{E8E257E0-6402-4869-8630-1AF38E65F0DF}" type="datetimeFigureOut">
               <a:rPr lang="en-AU" smtClean="0"/>
-              <a:t>9/09/2016</a:t>
+              <a:t>10/09/2016</a:t>
             </a:fld>
             <a:endParaRPr lang="en-AU"/>
           </a:p>
@@ -489,7 +495,7 @@
           <a:p>
             <a:fld id="{E8E257E0-6402-4869-8630-1AF38E65F0DF}" type="datetimeFigureOut">
               <a:rPr lang="en-AU" smtClean="0"/>
-              <a:t>9/09/2016</a:t>
+              <a:t>10/09/2016</a:t>
             </a:fld>
             <a:endParaRPr lang="en-AU"/>
           </a:p>
@@ -669,7 +675,7 @@
           <a:p>
             <a:fld id="{E8E257E0-6402-4869-8630-1AF38E65F0DF}" type="datetimeFigureOut">
               <a:rPr lang="en-AU" smtClean="0"/>
-              <a:t>9/09/2016</a:t>
+              <a:t>10/09/2016</a:t>
             </a:fld>
             <a:endParaRPr lang="en-AU"/>
           </a:p>
@@ -839,7 +845,7 @@
           <a:p>
             <a:fld id="{E8E257E0-6402-4869-8630-1AF38E65F0DF}" type="datetimeFigureOut">
               <a:rPr lang="en-AU" smtClean="0"/>
-              <a:t>9/09/2016</a:t>
+              <a:t>10/09/2016</a:t>
             </a:fld>
             <a:endParaRPr lang="en-AU"/>
           </a:p>
@@ -1085,7 +1091,7 @@
           <a:p>
             <a:fld id="{E8E257E0-6402-4869-8630-1AF38E65F0DF}" type="datetimeFigureOut">
               <a:rPr lang="en-AU" smtClean="0"/>
-              <a:t>9/09/2016</a:t>
+              <a:t>10/09/2016</a:t>
             </a:fld>
             <a:endParaRPr lang="en-AU"/>
           </a:p>
@@ -1373,7 +1379,7 @@
           <a:p>
             <a:fld id="{E8E257E0-6402-4869-8630-1AF38E65F0DF}" type="datetimeFigureOut">
               <a:rPr lang="en-AU" smtClean="0"/>
-              <a:t>9/09/2016</a:t>
+              <a:t>10/09/2016</a:t>
             </a:fld>
             <a:endParaRPr lang="en-AU"/>
           </a:p>
@@ -1795,7 +1801,7 @@
           <a:p>
             <a:fld id="{E8E257E0-6402-4869-8630-1AF38E65F0DF}" type="datetimeFigureOut">
               <a:rPr lang="en-AU" smtClean="0"/>
-              <a:t>9/09/2016</a:t>
+              <a:t>10/09/2016</a:t>
             </a:fld>
             <a:endParaRPr lang="en-AU"/>
           </a:p>
@@ -1913,7 +1919,7 @@
           <a:p>
             <a:fld id="{E8E257E0-6402-4869-8630-1AF38E65F0DF}" type="datetimeFigureOut">
               <a:rPr lang="en-AU" smtClean="0"/>
-              <a:t>9/09/2016</a:t>
+              <a:t>10/09/2016</a:t>
             </a:fld>
             <a:endParaRPr lang="en-AU"/>
           </a:p>
@@ -2008,7 +2014,7 @@
           <a:p>
             <a:fld id="{E8E257E0-6402-4869-8630-1AF38E65F0DF}" type="datetimeFigureOut">
               <a:rPr lang="en-AU" smtClean="0"/>
-              <a:t>9/09/2016</a:t>
+              <a:t>10/09/2016</a:t>
             </a:fld>
             <a:endParaRPr lang="en-AU"/>
           </a:p>
@@ -2285,7 +2291,7 @@
           <a:p>
             <a:fld id="{E8E257E0-6402-4869-8630-1AF38E65F0DF}" type="datetimeFigureOut">
               <a:rPr lang="en-AU" smtClean="0"/>
-              <a:t>9/09/2016</a:t>
+              <a:t>10/09/2016</a:t>
             </a:fld>
             <a:endParaRPr lang="en-AU"/>
           </a:p>
@@ -2538,7 +2544,7 @@
           <a:p>
             <a:fld id="{E8E257E0-6402-4869-8630-1AF38E65F0DF}" type="datetimeFigureOut">
               <a:rPr lang="en-AU" smtClean="0"/>
-              <a:t>9/09/2016</a:t>
+              <a:t>10/09/2016</a:t>
             </a:fld>
             <a:endParaRPr lang="en-AU"/>
           </a:p>
@@ -2775,7 +2781,7 @@
           <a:p>
             <a:fld id="{E8E257E0-6402-4869-8630-1AF38E65F0DF}" type="datetimeFigureOut">
               <a:rPr lang="en-AU" smtClean="0"/>
-              <a:t>9/09/2016</a:t>
+              <a:t>10/09/2016</a:t>
             </a:fld>
             <a:endParaRPr lang="en-AU"/>
           </a:p>
@@ -4441,6 +4447,119 @@
           <a:bodyPr/>
           <a:lstStyle/>
           <a:p>
+            <a:r>
+              <a:rPr lang="en-AU" dirty="0" smtClean="0"/>
+              <a:t>Pipes</a:t>
+            </a:r>
+            <a:endParaRPr lang="en-AU" dirty="0"/>
+          </a:p>
+        </p:txBody>
+      </p:sp>
+      <p:sp>
+        <p:nvSpPr>
+          <p:cNvPr id="3" name="Content Placeholder 2"/>
+          <p:cNvSpPr>
+            <a:spLocks noGrp="1"/>
+          </p:cNvSpPr>
+          <p:nvPr>
+            <p:ph idx="1"/>
+          </p:nvPr>
+        </p:nvSpPr>
+        <p:spPr/>
+        <p:txBody>
+          <a:bodyPr/>
+          <a:lstStyle/>
+          <a:p>
+            <a:r>
+              <a:rPr lang="en-AU" dirty="0"/>
+              <a:t>Pipes transform displayed values within a </a:t>
+            </a:r>
+            <a:r>
+              <a:rPr lang="en-AU" dirty="0" smtClean="0"/>
+              <a:t>template</a:t>
+            </a:r>
+          </a:p>
+          <a:p>
+            <a:r>
+              <a:rPr lang="en-AU" dirty="0" smtClean="0"/>
+              <a:t>&lt;p&gt;Transaction Date {{ </a:t>
+            </a:r>
+            <a:r>
+              <a:rPr lang="en-AU" dirty="0" err="1" smtClean="0"/>
+              <a:t>txDate</a:t>
+            </a:r>
+            <a:r>
+              <a:rPr lang="en-AU" dirty="0" smtClean="0"/>
+              <a:t> </a:t>
+            </a:r>
+            <a:r>
+              <a:rPr lang="en-AU" dirty="0">
+                <a:solidFill>
+                  <a:srgbClr val="FF0000"/>
+                </a:solidFill>
+              </a:rPr>
+              <a:t>| date </a:t>
+            </a:r>
+            <a:r>
+              <a:rPr lang="en-AU" dirty="0"/>
+              <a:t>}}&lt;/p&gt;</a:t>
+            </a:r>
+            <a:endParaRPr lang="en-AU" dirty="0"/>
+          </a:p>
+        </p:txBody>
+      </p:sp>
+    </p:spTree>
+    <p:extLst>
+      <p:ext uri="{BB962C8B-B14F-4D97-AF65-F5344CB8AC3E}">
+        <p14:creationId xmlns:p14="http://schemas.microsoft.com/office/powerpoint/2010/main" val="2521955431"/>
+      </p:ext>
+    </p:extLst>
+  </p:cSld>
+  <p:clrMapOvr>
+    <a:masterClrMapping/>
+  </p:clrMapOvr>
+  <p:timing>
+    <p:tnLst>
+      <p:par>
+        <p:cTn id="1" dur="indefinite" restart="never" nodeType="tmRoot"/>
+      </p:par>
+    </p:tnLst>
+  </p:timing>
+</p:sld>
+</file>
+
+<file path=ppt/slides/slide13.xml><?xml version="1.0" encoding="utf-8"?>
+<p:sld xmlns:a="http://schemas.openxmlformats.org/drawingml/2006/main" xmlns:r="http://schemas.openxmlformats.org/officeDocument/2006/relationships" xmlns:p="http://schemas.openxmlformats.org/presentationml/2006/main">
+  <p:cSld>
+    <p:spTree>
+      <p:nvGrpSpPr>
+        <p:cNvPr id="1" name=""/>
+        <p:cNvGrpSpPr/>
+        <p:nvPr/>
+      </p:nvGrpSpPr>
+      <p:grpSpPr>
+        <a:xfrm>
+          <a:off x="0" y="0"/>
+          <a:ext cx="0" cy="0"/>
+          <a:chOff x="0" y="0"/>
+          <a:chExt cx="0" cy="0"/>
+        </a:xfrm>
+      </p:grpSpPr>
+      <p:sp>
+        <p:nvSpPr>
+          <p:cNvPr id="2" name="Title 1"/>
+          <p:cNvSpPr>
+            <a:spLocks noGrp="1"/>
+          </p:cNvSpPr>
+          <p:nvPr>
+            <p:ph type="title"/>
+          </p:nvPr>
+        </p:nvSpPr>
+        <p:spPr/>
+        <p:txBody>
+          <a:bodyPr/>
+          <a:lstStyle/>
+          <a:p>
             <a:endParaRPr lang="en-AU" dirty="0"/>
           </a:p>
         </p:txBody>
@@ -4494,7 +4613,7 @@
 </p:sld>
 </file>
 
-<file path=ppt/slides/slide13.xml><?xml version="1.0" encoding="utf-8"?>
+<file path=ppt/slides/slide14.xml><?xml version="1.0" encoding="utf-8"?>
 <p:sld xmlns:a="http://schemas.openxmlformats.org/drawingml/2006/main" xmlns:r="http://schemas.openxmlformats.org/officeDocument/2006/relationships" xmlns:p="http://schemas.openxmlformats.org/presentationml/2006/main">
   <p:cSld>
     <p:spTree>
@@ -4767,7 +4886,7 @@
 </p:sld>
 </file>
 
-<file path=ppt/slides/slide14.xml><?xml version="1.0" encoding="utf-8"?>
+<file path=ppt/slides/slide15.xml><?xml version="1.0" encoding="utf-8"?>
 <p:sld xmlns:a="http://schemas.openxmlformats.org/drawingml/2006/main" xmlns:r="http://schemas.openxmlformats.org/officeDocument/2006/relationships" xmlns:p="http://schemas.openxmlformats.org/presentationml/2006/main">
   <p:cSld>
     <p:spTree>
@@ -5098,7 +5217,7 @@
 </p:sld>
 </file>
 
-<file path=ppt/slides/slide15.xml><?xml version="1.0" encoding="utf-8"?>
+<file path=ppt/slides/slide16.xml><?xml version="1.0" encoding="utf-8"?>
 <p:sld xmlns:a="http://schemas.openxmlformats.org/drawingml/2006/main" xmlns:r="http://schemas.openxmlformats.org/officeDocument/2006/relationships" xmlns:p="http://schemas.openxmlformats.org/presentationml/2006/main">
   <p:cSld>
     <p:spTree>
@@ -6300,7 +6419,7 @@
 </p:sld>
 </file>
 
-<file path=ppt/slides/slide16.xml><?xml version="1.0" encoding="utf-8"?>
+<file path=ppt/slides/slide17.xml><?xml version="1.0" encoding="utf-8"?>
 <p:sld xmlns:a="http://schemas.openxmlformats.org/drawingml/2006/main" xmlns:r="http://schemas.openxmlformats.org/officeDocument/2006/relationships" xmlns:p="http://schemas.openxmlformats.org/presentationml/2006/main">
   <p:cSld>
     <p:spTree>
@@ -6363,6 +6482,377 @@
     <p:extLst>
       <p:ext uri="{BB962C8B-B14F-4D97-AF65-F5344CB8AC3E}">
         <p14:creationId xmlns:p14="http://schemas.microsoft.com/office/powerpoint/2010/main" val="2641020921"/>
+      </p:ext>
+    </p:extLst>
+  </p:cSld>
+  <p:clrMapOvr>
+    <a:masterClrMapping/>
+  </p:clrMapOvr>
+  <p:timing>
+    <p:tnLst>
+      <p:par>
+        <p:cTn id="1" dur="indefinite" restart="never" nodeType="tmRoot"/>
+      </p:par>
+    </p:tnLst>
+  </p:timing>
+</p:sld>
+</file>
+
+<file path=ppt/slides/slide18.xml><?xml version="1.0" encoding="utf-8"?>
+<p:sld xmlns:a="http://schemas.openxmlformats.org/drawingml/2006/main" xmlns:r="http://schemas.openxmlformats.org/officeDocument/2006/relationships" xmlns:p="http://schemas.openxmlformats.org/presentationml/2006/main">
+  <p:cSld>
+    <p:spTree>
+      <p:nvGrpSpPr>
+        <p:cNvPr id="1" name=""/>
+        <p:cNvGrpSpPr/>
+        <p:nvPr/>
+      </p:nvGrpSpPr>
+      <p:grpSpPr>
+        <a:xfrm>
+          <a:off x="0" y="0"/>
+          <a:ext cx="0" cy="0"/>
+          <a:chOff x="0" y="0"/>
+          <a:chExt cx="0" cy="0"/>
+        </a:xfrm>
+      </p:grpSpPr>
+      <p:sp>
+        <p:nvSpPr>
+          <p:cNvPr id="2" name="Title 1"/>
+          <p:cNvSpPr>
+            <a:spLocks noGrp="1"/>
+          </p:cNvSpPr>
+          <p:nvPr>
+            <p:ph type="title"/>
+          </p:nvPr>
+        </p:nvSpPr>
+        <p:spPr/>
+        <p:txBody>
+          <a:bodyPr/>
+          <a:lstStyle/>
+          <a:p>
+            <a:r>
+              <a:rPr lang="en-AU" dirty="0" smtClean="0"/>
+              <a:t>Http</a:t>
+            </a:r>
+            <a:endParaRPr lang="en-AU" dirty="0"/>
+          </a:p>
+        </p:txBody>
+      </p:sp>
+      <p:sp>
+        <p:nvSpPr>
+          <p:cNvPr id="3" name="Content Placeholder 2"/>
+          <p:cNvSpPr>
+            <a:spLocks noGrp="1"/>
+          </p:cNvSpPr>
+          <p:nvPr>
+            <p:ph idx="1"/>
+          </p:nvPr>
+        </p:nvSpPr>
+        <p:spPr/>
+        <p:txBody>
+          <a:bodyPr/>
+          <a:lstStyle/>
+          <a:p>
+            <a:r>
+              <a:rPr lang="en-AU" dirty="0" smtClean="0"/>
+              <a:t>A separate module in Angular 2</a:t>
+            </a:r>
+          </a:p>
+          <a:p>
+            <a:r>
+              <a:rPr lang="en-AU" dirty="0" smtClean="0"/>
+              <a:t>Instead of returning a Promise, it returns Observable</a:t>
+            </a:r>
+          </a:p>
+          <a:p>
+            <a:r>
+              <a:rPr lang="en-AU" dirty="0" smtClean="0"/>
+              <a:t>Why? Before answering, let’s have a look at what is Observable</a:t>
+            </a:r>
+            <a:endParaRPr lang="en-AU" dirty="0"/>
+          </a:p>
+        </p:txBody>
+      </p:sp>
+    </p:spTree>
+    <p:extLst>
+      <p:ext uri="{BB962C8B-B14F-4D97-AF65-F5344CB8AC3E}">
+        <p14:creationId xmlns:p14="http://schemas.microsoft.com/office/powerpoint/2010/main" val="1826103453"/>
+      </p:ext>
+    </p:extLst>
+  </p:cSld>
+  <p:clrMapOvr>
+    <a:masterClrMapping/>
+  </p:clrMapOvr>
+  <p:timing>
+    <p:tnLst>
+      <p:par>
+        <p:cTn id="1" dur="indefinite" restart="never" nodeType="tmRoot">
+          <p:childTnLst>
+            <p:seq concurrent="1" nextAc="seek">
+              <p:cTn id="2" dur="indefinite" nodeType="mainSeq">
+                <p:childTnLst>
+                  <p:par>
+                    <p:cTn id="3" fill="hold">
+                      <p:stCondLst>
+                        <p:cond delay="indefinite"/>
+                      </p:stCondLst>
+                      <p:childTnLst>
+                        <p:par>
+                          <p:cTn id="4" fill="hold">
+                            <p:stCondLst>
+                              <p:cond delay="0"/>
+                            </p:stCondLst>
+                            <p:childTnLst>
+                              <p:par>
+                                <p:cTn id="5" presetID="1" presetClass="entr" presetSubtype="0" fill="hold" grpId="0" nodeType="clickEffect">
+                                  <p:stCondLst>
+                                    <p:cond delay="0"/>
+                                  </p:stCondLst>
+                                  <p:childTnLst>
+                                    <p:set>
+                                      <p:cBhvr>
+                                        <p:cTn id="6" dur="1" fill="hold">
+                                          <p:stCondLst>
+                                            <p:cond delay="0"/>
+                                          </p:stCondLst>
+                                        </p:cTn>
+                                        <p:tgtEl>
+                                          <p:spTgt spid="3">
+                                            <p:txEl>
+                                              <p:pRg st="0" end="0"/>
+                                            </p:txEl>
+                                          </p:spTgt>
+                                        </p:tgtEl>
+                                        <p:attrNameLst>
+                                          <p:attrName>style.visibility</p:attrName>
+                                        </p:attrNameLst>
+                                      </p:cBhvr>
+                                      <p:to>
+                                        <p:strVal val="visible"/>
+                                      </p:to>
+                                    </p:set>
+                                  </p:childTnLst>
+                                </p:cTn>
+                              </p:par>
+                            </p:childTnLst>
+                          </p:cTn>
+                        </p:par>
+                      </p:childTnLst>
+                    </p:cTn>
+                  </p:par>
+                  <p:par>
+                    <p:cTn id="7" fill="hold">
+                      <p:stCondLst>
+                        <p:cond delay="indefinite"/>
+                      </p:stCondLst>
+                      <p:childTnLst>
+                        <p:par>
+                          <p:cTn id="8" fill="hold">
+                            <p:stCondLst>
+                              <p:cond delay="0"/>
+                            </p:stCondLst>
+                            <p:childTnLst>
+                              <p:par>
+                                <p:cTn id="9" presetID="1" presetClass="entr" presetSubtype="0" fill="hold" grpId="0" nodeType="clickEffect">
+                                  <p:stCondLst>
+                                    <p:cond delay="0"/>
+                                  </p:stCondLst>
+                                  <p:childTnLst>
+                                    <p:set>
+                                      <p:cBhvr>
+                                        <p:cTn id="10" dur="1" fill="hold">
+                                          <p:stCondLst>
+                                            <p:cond delay="0"/>
+                                          </p:stCondLst>
+                                        </p:cTn>
+                                        <p:tgtEl>
+                                          <p:spTgt spid="3">
+                                            <p:txEl>
+                                              <p:pRg st="1" end="1"/>
+                                            </p:txEl>
+                                          </p:spTgt>
+                                        </p:tgtEl>
+                                        <p:attrNameLst>
+                                          <p:attrName>style.visibility</p:attrName>
+                                        </p:attrNameLst>
+                                      </p:cBhvr>
+                                      <p:to>
+                                        <p:strVal val="visible"/>
+                                      </p:to>
+                                    </p:set>
+                                  </p:childTnLst>
+                                </p:cTn>
+                              </p:par>
+                            </p:childTnLst>
+                          </p:cTn>
+                        </p:par>
+                      </p:childTnLst>
+                    </p:cTn>
+                  </p:par>
+                  <p:par>
+                    <p:cTn id="11" fill="hold">
+                      <p:stCondLst>
+                        <p:cond delay="indefinite"/>
+                      </p:stCondLst>
+                      <p:childTnLst>
+                        <p:par>
+                          <p:cTn id="12" fill="hold">
+                            <p:stCondLst>
+                              <p:cond delay="0"/>
+                            </p:stCondLst>
+                            <p:childTnLst>
+                              <p:par>
+                                <p:cTn id="13" presetID="1" presetClass="entr" presetSubtype="0" fill="hold" grpId="0" nodeType="clickEffect">
+                                  <p:stCondLst>
+                                    <p:cond delay="0"/>
+                                  </p:stCondLst>
+                                  <p:childTnLst>
+                                    <p:set>
+                                      <p:cBhvr>
+                                        <p:cTn id="14" dur="1" fill="hold">
+                                          <p:stCondLst>
+                                            <p:cond delay="0"/>
+                                          </p:stCondLst>
+                                        </p:cTn>
+                                        <p:tgtEl>
+                                          <p:spTgt spid="3">
+                                            <p:txEl>
+                                              <p:pRg st="2" end="2"/>
+                                            </p:txEl>
+                                          </p:spTgt>
+                                        </p:tgtEl>
+                                        <p:attrNameLst>
+                                          <p:attrName>style.visibility</p:attrName>
+                                        </p:attrNameLst>
+                                      </p:cBhvr>
+                                      <p:to>
+                                        <p:strVal val="visible"/>
+                                      </p:to>
+                                    </p:set>
+                                  </p:childTnLst>
+                                </p:cTn>
+                              </p:par>
+                            </p:childTnLst>
+                          </p:cTn>
+                        </p:par>
+                      </p:childTnLst>
+                    </p:cTn>
+                  </p:par>
+                </p:childTnLst>
+              </p:cTn>
+              <p:prevCondLst>
+                <p:cond evt="onPrev" delay="0">
+                  <p:tgtEl>
+                    <p:sldTgt/>
+                  </p:tgtEl>
+                </p:cond>
+              </p:prevCondLst>
+              <p:nextCondLst>
+                <p:cond evt="onNext" delay="0">
+                  <p:tgtEl>
+                    <p:sldTgt/>
+                  </p:tgtEl>
+                </p:cond>
+              </p:nextCondLst>
+            </p:seq>
+          </p:childTnLst>
+        </p:cTn>
+      </p:par>
+    </p:tnLst>
+    <p:bldLst>
+      <p:bldP spid="3" grpId="0" build="p"/>
+    </p:bldLst>
+  </p:timing>
+</p:sld>
+</file>
+
+<file path=ppt/slides/slide19.xml><?xml version="1.0" encoding="utf-8"?>
+<p:sld xmlns:a="http://schemas.openxmlformats.org/drawingml/2006/main" xmlns:r="http://schemas.openxmlformats.org/officeDocument/2006/relationships" xmlns:p="http://schemas.openxmlformats.org/presentationml/2006/main">
+  <p:cSld>
+    <p:spTree>
+      <p:nvGrpSpPr>
+        <p:cNvPr id="1" name=""/>
+        <p:cNvGrpSpPr/>
+        <p:nvPr/>
+      </p:nvGrpSpPr>
+      <p:grpSpPr>
+        <a:xfrm>
+          <a:off x="0" y="0"/>
+          <a:ext cx="0" cy="0"/>
+          <a:chOff x="0" y="0"/>
+          <a:chExt cx="0" cy="0"/>
+        </a:xfrm>
+      </p:grpSpPr>
+      <p:sp>
+        <p:nvSpPr>
+          <p:cNvPr id="2" name="Title 1"/>
+          <p:cNvSpPr>
+            <a:spLocks noGrp="1"/>
+          </p:cNvSpPr>
+          <p:nvPr>
+            <p:ph type="title"/>
+          </p:nvPr>
+        </p:nvSpPr>
+        <p:spPr/>
+        <p:txBody>
+          <a:bodyPr/>
+          <a:lstStyle/>
+          <a:p>
+            <a:r>
+              <a:rPr lang="en-AU" dirty="0" smtClean="0"/>
+              <a:t>What is a observable</a:t>
+            </a:r>
+            <a:endParaRPr lang="en-AU" dirty="0"/>
+          </a:p>
+        </p:txBody>
+      </p:sp>
+      <p:sp>
+        <p:nvSpPr>
+          <p:cNvPr id="3" name="Content Placeholder 2"/>
+          <p:cNvSpPr>
+            <a:spLocks noGrp="1"/>
+          </p:cNvSpPr>
+          <p:nvPr>
+            <p:ph idx="1"/>
+          </p:nvPr>
+        </p:nvSpPr>
+        <p:spPr/>
+        <p:txBody>
+          <a:bodyPr/>
+          <a:lstStyle/>
+          <a:p>
+            <a:r>
+              <a:rPr lang="en-AU" dirty="0"/>
+              <a:t>An </a:t>
+            </a:r>
+            <a:r>
+              <a:rPr lang="en-AU" i="1" dirty="0"/>
+              <a:t>observable</a:t>
+            </a:r>
+            <a:r>
+              <a:rPr lang="en-AU" dirty="0"/>
+              <a:t> is a stream of events that we can process with array-like </a:t>
+            </a:r>
+            <a:r>
+              <a:rPr lang="en-AU" dirty="0" smtClean="0"/>
+              <a:t>operators</a:t>
+            </a:r>
+          </a:p>
+          <a:p>
+            <a:pPr marL="0" indent="0">
+              <a:buNone/>
+            </a:pPr>
+            <a:endParaRPr lang="en-AU" dirty="0" smtClean="0"/>
+          </a:p>
+          <a:p>
+            <a:endParaRPr lang="en-AU" dirty="0"/>
+          </a:p>
+        </p:txBody>
+      </p:sp>
+    </p:spTree>
+    <p:extLst>
+      <p:ext uri="{BB962C8B-B14F-4D97-AF65-F5344CB8AC3E}">
+        <p14:creationId xmlns:p14="http://schemas.microsoft.com/office/powerpoint/2010/main" val="2580479183"/>
       </p:ext>
     </p:extLst>
   </p:cSld>
@@ -6446,6 +6936,602 @@
     <p:extLst>
       <p:ext uri="{BB962C8B-B14F-4D97-AF65-F5344CB8AC3E}">
         <p14:creationId xmlns:p14="http://schemas.microsoft.com/office/powerpoint/2010/main" val="3299632925"/>
+      </p:ext>
+    </p:extLst>
+  </p:cSld>
+  <p:clrMapOvr>
+    <a:masterClrMapping/>
+  </p:clrMapOvr>
+  <p:timing>
+    <p:tnLst>
+      <p:par>
+        <p:cTn id="1" dur="indefinite" restart="never" nodeType="tmRoot"/>
+      </p:par>
+    </p:tnLst>
+  </p:timing>
+</p:sld>
+</file>
+
+<file path=ppt/slides/slide20.xml><?xml version="1.0" encoding="utf-8"?>
+<p:sld xmlns:a="http://schemas.openxmlformats.org/drawingml/2006/main" xmlns:r="http://schemas.openxmlformats.org/officeDocument/2006/relationships" xmlns:p="http://schemas.openxmlformats.org/presentationml/2006/main">
+  <p:cSld>
+    <p:spTree>
+      <p:nvGrpSpPr>
+        <p:cNvPr id="1" name=""/>
+        <p:cNvGrpSpPr/>
+        <p:nvPr/>
+      </p:nvGrpSpPr>
+      <p:grpSpPr>
+        <a:xfrm>
+          <a:off x="0" y="0"/>
+          <a:ext cx="0" cy="0"/>
+          <a:chOff x="0" y="0"/>
+          <a:chExt cx="0" cy="0"/>
+        </a:xfrm>
+      </p:grpSpPr>
+      <p:sp>
+        <p:nvSpPr>
+          <p:cNvPr id="2" name="Title 1"/>
+          <p:cNvSpPr>
+            <a:spLocks noGrp="1"/>
+          </p:cNvSpPr>
+          <p:nvPr>
+            <p:ph type="title"/>
+          </p:nvPr>
+        </p:nvSpPr>
+        <p:spPr/>
+        <p:txBody>
+          <a:bodyPr>
+            <a:normAutofit/>
+          </a:bodyPr>
+          <a:lstStyle/>
+          <a:p>
+            <a:r>
+              <a:rPr lang="en-AU" dirty="0" smtClean="0"/>
+              <a:t>What is Observable</a:t>
+            </a:r>
+            <a:endParaRPr lang="en-AU" dirty="0"/>
+          </a:p>
+        </p:txBody>
+      </p:sp>
+      <p:pic>
+        <p:nvPicPr>
+          <p:cNvPr id="4" name="Content Placeholder 3"/>
+          <p:cNvPicPr>
+            <a:picLocks noGrp="1" noChangeAspect="1"/>
+          </p:cNvPicPr>
+          <p:nvPr>
+            <p:ph idx="1"/>
+          </p:nvPr>
+        </p:nvPicPr>
+        <p:blipFill>
+          <a:blip r:embed="rId2">
+            <a:extLst>
+              <a:ext uri="{28A0092B-C50C-407E-A947-70E740481C1C}">
+                <a14:useLocalDpi xmlns:a14="http://schemas.microsoft.com/office/drawing/2010/main" val="0"/>
+              </a:ext>
+            </a:extLst>
+          </a:blip>
+          <a:stretch>
+            <a:fillRect/>
+          </a:stretch>
+        </p:blipFill>
+        <p:spPr>
+          <a:xfrm>
+            <a:off x="0" y="1988840"/>
+            <a:ext cx="9144000" cy="4399998"/>
+          </a:xfrm>
+        </p:spPr>
+      </p:pic>
+      <p:sp>
+        <p:nvSpPr>
+          <p:cNvPr id="5" name="TextBox 4"/>
+          <p:cNvSpPr txBox="1"/>
+          <p:nvPr/>
+        </p:nvSpPr>
+        <p:spPr>
+          <a:xfrm>
+            <a:off x="1619671" y="6488668"/>
+            <a:ext cx="5032916" cy="369332"/>
+          </a:xfrm>
+          <a:prstGeom prst="rect">
+            <a:avLst/>
+          </a:prstGeom>
+          <a:noFill/>
+        </p:spPr>
+        <p:txBody>
+          <a:bodyPr wrap="none" rtlCol="0">
+            <a:spAutoFit/>
+          </a:bodyPr>
+          <a:lstStyle/>
+          <a:p>
+            <a:r>
+              <a:rPr lang="en-AU" dirty="0"/>
+              <a:t>http://reactivex.io/documentation/observable.html</a:t>
+            </a:r>
+          </a:p>
+        </p:txBody>
+      </p:sp>
+    </p:spTree>
+    <p:extLst>
+      <p:ext uri="{BB962C8B-B14F-4D97-AF65-F5344CB8AC3E}">
+        <p14:creationId xmlns:p14="http://schemas.microsoft.com/office/powerpoint/2010/main" val="3591584323"/>
+      </p:ext>
+    </p:extLst>
+  </p:cSld>
+  <p:clrMapOvr>
+    <a:masterClrMapping/>
+  </p:clrMapOvr>
+  <p:timing>
+    <p:tnLst>
+      <p:par>
+        <p:cTn id="1" dur="indefinite" restart="never" nodeType="tmRoot"/>
+      </p:par>
+    </p:tnLst>
+  </p:timing>
+</p:sld>
+</file>
+
+<file path=ppt/slides/slide21.xml><?xml version="1.0" encoding="utf-8"?>
+<p:sld xmlns:a="http://schemas.openxmlformats.org/drawingml/2006/main" xmlns:r="http://schemas.openxmlformats.org/officeDocument/2006/relationships" xmlns:p="http://schemas.openxmlformats.org/presentationml/2006/main">
+  <p:cSld>
+    <p:spTree>
+      <p:nvGrpSpPr>
+        <p:cNvPr id="1" name=""/>
+        <p:cNvGrpSpPr/>
+        <p:nvPr/>
+      </p:nvGrpSpPr>
+      <p:grpSpPr>
+        <a:xfrm>
+          <a:off x="0" y="0"/>
+          <a:ext cx="0" cy="0"/>
+          <a:chOff x="0" y="0"/>
+          <a:chExt cx="0" cy="0"/>
+        </a:xfrm>
+      </p:grpSpPr>
+      <p:sp>
+        <p:nvSpPr>
+          <p:cNvPr id="2" name="Title 1"/>
+          <p:cNvSpPr>
+            <a:spLocks noGrp="1"/>
+          </p:cNvSpPr>
+          <p:nvPr>
+            <p:ph type="title"/>
+          </p:nvPr>
+        </p:nvSpPr>
+        <p:spPr/>
+        <p:txBody>
+          <a:bodyPr>
+            <a:normAutofit fontScale="90000"/>
+          </a:bodyPr>
+          <a:lstStyle/>
+          <a:p>
+            <a:r>
+              <a:rPr lang="en-AU" dirty="0" smtClean="0"/>
+              <a:t>Why Observable is better than Promise</a:t>
+            </a:r>
+            <a:endParaRPr lang="en-AU" dirty="0"/>
+          </a:p>
+        </p:txBody>
+      </p:sp>
+      <p:sp>
+        <p:nvSpPr>
+          <p:cNvPr id="3" name="Content Placeholder 2"/>
+          <p:cNvSpPr>
+            <a:spLocks noGrp="1"/>
+          </p:cNvSpPr>
+          <p:nvPr>
+            <p:ph idx="1"/>
+          </p:nvPr>
+        </p:nvSpPr>
+        <p:spPr/>
+        <p:txBody>
+          <a:bodyPr/>
+          <a:lstStyle/>
+          <a:p>
+            <a:r>
+              <a:rPr lang="en-AU" dirty="0" smtClean="0"/>
+              <a:t>Promise is good for single one and done pattern</a:t>
+            </a:r>
+          </a:p>
+          <a:p>
+            <a:r>
+              <a:rPr lang="en-AU" dirty="0" smtClean="0"/>
+              <a:t>Request -&gt; Cancel -&gt; New Request</a:t>
+            </a:r>
+          </a:p>
+          <a:p>
+            <a:r>
+              <a:rPr lang="en-AU" dirty="0" smtClean="0"/>
+              <a:t>Request -&gt; some validation -&gt; Request</a:t>
+            </a:r>
+          </a:p>
+          <a:p>
+            <a:r>
+              <a:rPr lang="en-AU" dirty="0" smtClean="0"/>
+              <a:t>The above patterns are not easy to deal with Promise</a:t>
+            </a:r>
+          </a:p>
+          <a:p>
+            <a:r>
+              <a:rPr lang="en-AU" dirty="0" smtClean="0"/>
+              <a:t>Filter junk traffic to the server</a:t>
+            </a:r>
+            <a:endParaRPr lang="en-AU" dirty="0"/>
+          </a:p>
+        </p:txBody>
+      </p:sp>
+    </p:spTree>
+    <p:extLst>
+      <p:ext uri="{BB962C8B-B14F-4D97-AF65-F5344CB8AC3E}">
+        <p14:creationId xmlns:p14="http://schemas.microsoft.com/office/powerpoint/2010/main" val="1443830643"/>
+      </p:ext>
+    </p:extLst>
+  </p:cSld>
+  <p:clrMapOvr>
+    <a:masterClrMapping/>
+  </p:clrMapOvr>
+  <p:timing>
+    <p:tnLst>
+      <p:par>
+        <p:cTn id="1" dur="indefinite" restart="never" nodeType="tmRoot">
+          <p:childTnLst>
+            <p:seq concurrent="1" nextAc="seek">
+              <p:cTn id="2" dur="indefinite" nodeType="mainSeq">
+                <p:childTnLst>
+                  <p:par>
+                    <p:cTn id="3" fill="hold">
+                      <p:stCondLst>
+                        <p:cond delay="indefinite"/>
+                      </p:stCondLst>
+                      <p:childTnLst>
+                        <p:par>
+                          <p:cTn id="4" fill="hold">
+                            <p:stCondLst>
+                              <p:cond delay="0"/>
+                            </p:stCondLst>
+                            <p:childTnLst>
+                              <p:par>
+                                <p:cTn id="5" presetID="1" presetClass="entr" presetSubtype="0" fill="hold" grpId="0" nodeType="clickEffect">
+                                  <p:stCondLst>
+                                    <p:cond delay="0"/>
+                                  </p:stCondLst>
+                                  <p:childTnLst>
+                                    <p:set>
+                                      <p:cBhvr>
+                                        <p:cTn id="6" dur="1" fill="hold">
+                                          <p:stCondLst>
+                                            <p:cond delay="0"/>
+                                          </p:stCondLst>
+                                        </p:cTn>
+                                        <p:tgtEl>
+                                          <p:spTgt spid="3">
+                                            <p:txEl>
+                                              <p:pRg st="0" end="0"/>
+                                            </p:txEl>
+                                          </p:spTgt>
+                                        </p:tgtEl>
+                                        <p:attrNameLst>
+                                          <p:attrName>style.visibility</p:attrName>
+                                        </p:attrNameLst>
+                                      </p:cBhvr>
+                                      <p:to>
+                                        <p:strVal val="visible"/>
+                                      </p:to>
+                                    </p:set>
+                                  </p:childTnLst>
+                                </p:cTn>
+                              </p:par>
+                            </p:childTnLst>
+                          </p:cTn>
+                        </p:par>
+                      </p:childTnLst>
+                    </p:cTn>
+                  </p:par>
+                  <p:par>
+                    <p:cTn id="7" fill="hold">
+                      <p:stCondLst>
+                        <p:cond delay="indefinite"/>
+                      </p:stCondLst>
+                      <p:childTnLst>
+                        <p:par>
+                          <p:cTn id="8" fill="hold">
+                            <p:stCondLst>
+                              <p:cond delay="0"/>
+                            </p:stCondLst>
+                            <p:childTnLst>
+                              <p:par>
+                                <p:cTn id="9" presetID="1" presetClass="entr" presetSubtype="0" fill="hold" grpId="0" nodeType="clickEffect">
+                                  <p:stCondLst>
+                                    <p:cond delay="0"/>
+                                  </p:stCondLst>
+                                  <p:childTnLst>
+                                    <p:set>
+                                      <p:cBhvr>
+                                        <p:cTn id="10" dur="1" fill="hold">
+                                          <p:stCondLst>
+                                            <p:cond delay="0"/>
+                                          </p:stCondLst>
+                                        </p:cTn>
+                                        <p:tgtEl>
+                                          <p:spTgt spid="3">
+                                            <p:txEl>
+                                              <p:pRg st="1" end="1"/>
+                                            </p:txEl>
+                                          </p:spTgt>
+                                        </p:tgtEl>
+                                        <p:attrNameLst>
+                                          <p:attrName>style.visibility</p:attrName>
+                                        </p:attrNameLst>
+                                      </p:cBhvr>
+                                      <p:to>
+                                        <p:strVal val="visible"/>
+                                      </p:to>
+                                    </p:set>
+                                  </p:childTnLst>
+                                </p:cTn>
+                              </p:par>
+                            </p:childTnLst>
+                          </p:cTn>
+                        </p:par>
+                      </p:childTnLst>
+                    </p:cTn>
+                  </p:par>
+                  <p:par>
+                    <p:cTn id="11" fill="hold">
+                      <p:stCondLst>
+                        <p:cond delay="indefinite"/>
+                      </p:stCondLst>
+                      <p:childTnLst>
+                        <p:par>
+                          <p:cTn id="12" fill="hold">
+                            <p:stCondLst>
+                              <p:cond delay="0"/>
+                            </p:stCondLst>
+                            <p:childTnLst>
+                              <p:par>
+                                <p:cTn id="13" presetID="1" presetClass="entr" presetSubtype="0" fill="hold" grpId="0" nodeType="clickEffect">
+                                  <p:stCondLst>
+                                    <p:cond delay="0"/>
+                                  </p:stCondLst>
+                                  <p:childTnLst>
+                                    <p:set>
+                                      <p:cBhvr>
+                                        <p:cTn id="14" dur="1" fill="hold">
+                                          <p:stCondLst>
+                                            <p:cond delay="0"/>
+                                          </p:stCondLst>
+                                        </p:cTn>
+                                        <p:tgtEl>
+                                          <p:spTgt spid="3">
+                                            <p:txEl>
+                                              <p:pRg st="2" end="2"/>
+                                            </p:txEl>
+                                          </p:spTgt>
+                                        </p:tgtEl>
+                                        <p:attrNameLst>
+                                          <p:attrName>style.visibility</p:attrName>
+                                        </p:attrNameLst>
+                                      </p:cBhvr>
+                                      <p:to>
+                                        <p:strVal val="visible"/>
+                                      </p:to>
+                                    </p:set>
+                                  </p:childTnLst>
+                                </p:cTn>
+                              </p:par>
+                            </p:childTnLst>
+                          </p:cTn>
+                        </p:par>
+                      </p:childTnLst>
+                    </p:cTn>
+                  </p:par>
+                  <p:par>
+                    <p:cTn id="15" fill="hold">
+                      <p:stCondLst>
+                        <p:cond delay="indefinite"/>
+                      </p:stCondLst>
+                      <p:childTnLst>
+                        <p:par>
+                          <p:cTn id="16" fill="hold">
+                            <p:stCondLst>
+                              <p:cond delay="0"/>
+                            </p:stCondLst>
+                            <p:childTnLst>
+                              <p:par>
+                                <p:cTn id="17" presetID="1" presetClass="entr" presetSubtype="0" fill="hold" grpId="0" nodeType="clickEffect">
+                                  <p:stCondLst>
+                                    <p:cond delay="0"/>
+                                  </p:stCondLst>
+                                  <p:childTnLst>
+                                    <p:set>
+                                      <p:cBhvr>
+                                        <p:cTn id="18" dur="1" fill="hold">
+                                          <p:stCondLst>
+                                            <p:cond delay="0"/>
+                                          </p:stCondLst>
+                                        </p:cTn>
+                                        <p:tgtEl>
+                                          <p:spTgt spid="3">
+                                            <p:txEl>
+                                              <p:pRg st="3" end="3"/>
+                                            </p:txEl>
+                                          </p:spTgt>
+                                        </p:tgtEl>
+                                        <p:attrNameLst>
+                                          <p:attrName>style.visibility</p:attrName>
+                                        </p:attrNameLst>
+                                      </p:cBhvr>
+                                      <p:to>
+                                        <p:strVal val="visible"/>
+                                      </p:to>
+                                    </p:set>
+                                  </p:childTnLst>
+                                </p:cTn>
+                              </p:par>
+                            </p:childTnLst>
+                          </p:cTn>
+                        </p:par>
+                      </p:childTnLst>
+                    </p:cTn>
+                  </p:par>
+                  <p:par>
+                    <p:cTn id="19" fill="hold">
+                      <p:stCondLst>
+                        <p:cond delay="indefinite"/>
+                      </p:stCondLst>
+                      <p:childTnLst>
+                        <p:par>
+                          <p:cTn id="20" fill="hold">
+                            <p:stCondLst>
+                              <p:cond delay="0"/>
+                            </p:stCondLst>
+                            <p:childTnLst>
+                              <p:par>
+                                <p:cTn id="21" presetID="1" presetClass="entr" presetSubtype="0" fill="hold" grpId="0" nodeType="clickEffect">
+                                  <p:stCondLst>
+                                    <p:cond delay="0"/>
+                                  </p:stCondLst>
+                                  <p:childTnLst>
+                                    <p:set>
+                                      <p:cBhvr>
+                                        <p:cTn id="22" dur="1" fill="hold">
+                                          <p:stCondLst>
+                                            <p:cond delay="0"/>
+                                          </p:stCondLst>
+                                        </p:cTn>
+                                        <p:tgtEl>
+                                          <p:spTgt spid="3">
+                                            <p:txEl>
+                                              <p:pRg st="4" end="4"/>
+                                            </p:txEl>
+                                          </p:spTgt>
+                                        </p:tgtEl>
+                                        <p:attrNameLst>
+                                          <p:attrName>style.visibility</p:attrName>
+                                        </p:attrNameLst>
+                                      </p:cBhvr>
+                                      <p:to>
+                                        <p:strVal val="visible"/>
+                                      </p:to>
+                                    </p:set>
+                                  </p:childTnLst>
+                                </p:cTn>
+                              </p:par>
+                            </p:childTnLst>
+                          </p:cTn>
+                        </p:par>
+                      </p:childTnLst>
+                    </p:cTn>
+                  </p:par>
+                </p:childTnLst>
+              </p:cTn>
+              <p:prevCondLst>
+                <p:cond evt="onPrev" delay="0">
+                  <p:tgtEl>
+                    <p:sldTgt/>
+                  </p:tgtEl>
+                </p:cond>
+              </p:prevCondLst>
+              <p:nextCondLst>
+                <p:cond evt="onNext" delay="0">
+                  <p:tgtEl>
+                    <p:sldTgt/>
+                  </p:tgtEl>
+                </p:cond>
+              </p:nextCondLst>
+            </p:seq>
+          </p:childTnLst>
+        </p:cTn>
+      </p:par>
+    </p:tnLst>
+    <p:bldLst>
+      <p:bldP spid="3" grpId="0" build="p"/>
+    </p:bldLst>
+  </p:timing>
+</p:sld>
+</file>
+
+<file path=ppt/slides/slide22.xml><?xml version="1.0" encoding="utf-8"?>
+<p:sld xmlns:a="http://schemas.openxmlformats.org/drawingml/2006/main" xmlns:r="http://schemas.openxmlformats.org/officeDocument/2006/relationships" xmlns:p="http://schemas.openxmlformats.org/presentationml/2006/main">
+  <p:cSld>
+    <p:spTree>
+      <p:nvGrpSpPr>
+        <p:cNvPr id="1" name=""/>
+        <p:cNvGrpSpPr/>
+        <p:nvPr/>
+      </p:nvGrpSpPr>
+      <p:grpSpPr>
+        <a:xfrm>
+          <a:off x="0" y="0"/>
+          <a:ext cx="0" cy="0"/>
+          <a:chOff x="0" y="0"/>
+          <a:chExt cx="0" cy="0"/>
+        </a:xfrm>
+      </p:grpSpPr>
+      <p:sp>
+        <p:nvSpPr>
+          <p:cNvPr id="2" name="Title 1"/>
+          <p:cNvSpPr>
+            <a:spLocks noGrp="1"/>
+          </p:cNvSpPr>
+          <p:nvPr>
+            <p:ph type="title"/>
+          </p:nvPr>
+        </p:nvSpPr>
+        <p:spPr/>
+        <p:txBody>
+          <a:bodyPr/>
+          <a:lstStyle/>
+          <a:p>
+            <a:r>
+              <a:rPr lang="en-AU" dirty="0" err="1" smtClean="0"/>
+              <a:t>RxJs</a:t>
+            </a:r>
+            <a:endParaRPr lang="en-AU" dirty="0"/>
+          </a:p>
+        </p:txBody>
+      </p:sp>
+      <p:sp>
+        <p:nvSpPr>
+          <p:cNvPr id="3" name="Content Placeholder 2"/>
+          <p:cNvSpPr>
+            <a:spLocks noGrp="1"/>
+          </p:cNvSpPr>
+          <p:nvPr>
+            <p:ph idx="1"/>
+          </p:nvPr>
+        </p:nvSpPr>
+        <p:spPr/>
+        <p:txBody>
+          <a:bodyPr/>
+          <a:lstStyle/>
+          <a:p>
+            <a:r>
+              <a:rPr lang="en-AU" dirty="0"/>
+              <a:t>An API for asynchronous programming</a:t>
+            </a:r>
+            <a:br>
+              <a:rPr lang="en-AU" dirty="0"/>
+            </a:br>
+            <a:r>
+              <a:rPr lang="en-AU" dirty="0"/>
+              <a:t>with observable streams</a:t>
+            </a:r>
+          </a:p>
+          <a:p>
+            <a:r>
+              <a:rPr lang="en-AU" dirty="0" smtClean="0"/>
+              <a:t>Provides a list of operators to manage the observable, e.g. </a:t>
+            </a:r>
+            <a:endParaRPr lang="en-AU" dirty="0"/>
+          </a:p>
+        </p:txBody>
+      </p:sp>
+    </p:spTree>
+    <p:extLst>
+      <p:ext uri="{BB962C8B-B14F-4D97-AF65-F5344CB8AC3E}">
+        <p14:creationId xmlns:p14="http://schemas.microsoft.com/office/powerpoint/2010/main" val="2446403288"/>
       </p:ext>
     </p:extLst>
   </p:cSld>
@@ -6626,10 +7712,9 @@
           </a:p>
           <a:p>
             <a:r>
-              <a:rPr lang="en-US" smtClean="0"/>
+              <a:rPr lang="en-US" dirty="0" smtClean="0"/>
               <a:t>Pipe</a:t>
             </a:r>
-            <a:endParaRPr lang="en-US" dirty="0" smtClean="0"/>
           </a:p>
           <a:p>
             <a:r>
@@ -6646,14 +7731,9 @@
           <a:p>
             <a:r>
               <a:rPr lang="en-US" dirty="0" smtClean="0"/>
-              <a:t>Routing</a:t>
-            </a:r>
-          </a:p>
-          <a:p>
-            <a:r>
-              <a:rPr lang="en-US" dirty="0" smtClean="0"/>
               <a:t>Http</a:t>
             </a:r>
+            <a:endParaRPr lang="en-US" dirty="0" smtClean="0"/>
           </a:p>
           <a:p>
             <a:r>
@@ -6668,7 +7748,14 @@
               <a:rPr lang="en-US" dirty="0" err="1" smtClean="0"/>
               <a:t>observerable</a:t>
             </a:r>
-            <a:endParaRPr lang="en-AU" dirty="0"/>
+            <a:endParaRPr lang="en-US" dirty="0" smtClean="0"/>
+          </a:p>
+          <a:p>
+            <a:r>
+              <a:rPr lang="en-US" dirty="0" smtClean="0"/>
+              <a:t>Routing</a:t>
+            </a:r>
+            <a:endParaRPr lang="en-US" dirty="0"/>
           </a:p>
         </p:txBody>
       </p:sp>
@@ -7143,6 +8230,342 @@
           <a:lstStyle/>
           <a:p>
             <a:r>
+              <a:rPr lang="en-US" dirty="0" smtClean="0"/>
+              <a:t>Technologies for this demo</a:t>
+            </a:r>
+            <a:endParaRPr lang="en-AU" dirty="0"/>
+          </a:p>
+        </p:txBody>
+      </p:sp>
+      <p:sp>
+        <p:nvSpPr>
+          <p:cNvPr id="3" name="Content Placeholder 2"/>
+          <p:cNvSpPr>
+            <a:spLocks noGrp="1"/>
+          </p:cNvSpPr>
+          <p:nvPr>
+            <p:ph idx="1"/>
+          </p:nvPr>
+        </p:nvSpPr>
+        <p:spPr/>
+        <p:txBody>
+          <a:bodyPr/>
+          <a:lstStyle/>
+          <a:p>
+            <a:r>
+              <a:rPr lang="en-US" dirty="0" smtClean="0"/>
+              <a:t>Angular2 libs</a:t>
+            </a:r>
+          </a:p>
+          <a:p>
+            <a:r>
+              <a:rPr lang="en-US" dirty="0" smtClean="0"/>
+              <a:t>Typescript</a:t>
+            </a:r>
+          </a:p>
+          <a:p>
+            <a:r>
+              <a:rPr lang="en-US" dirty="0" smtClean="0"/>
+              <a:t>System.js (module loader, </a:t>
+            </a:r>
+            <a:r>
+              <a:rPr lang="en-US" dirty="0" err="1" smtClean="0"/>
+              <a:t>CommonJS</a:t>
+            </a:r>
+            <a:r>
+              <a:rPr lang="en-US" dirty="0" smtClean="0"/>
+              <a:t> AMD and ES2015 modules)</a:t>
+            </a:r>
+            <a:endParaRPr lang="en-US" dirty="0" smtClean="0"/>
+          </a:p>
+          <a:p>
+            <a:r>
+              <a:rPr lang="en-US" dirty="0" err="1" smtClean="0"/>
+              <a:t>RxJs</a:t>
+            </a:r>
+            <a:r>
+              <a:rPr lang="en-US" dirty="0" smtClean="0"/>
+              <a:t> (reactive extension, observable)</a:t>
+            </a:r>
+            <a:endParaRPr lang="en-AU" dirty="0"/>
+          </a:p>
+        </p:txBody>
+      </p:sp>
+    </p:spTree>
+    <p:extLst>
+      <p:ext uri="{BB962C8B-B14F-4D97-AF65-F5344CB8AC3E}">
+        <p14:creationId xmlns:p14="http://schemas.microsoft.com/office/powerpoint/2010/main" val="1477723824"/>
+      </p:ext>
+    </p:extLst>
+  </p:cSld>
+  <p:clrMapOvr>
+    <a:masterClrMapping/>
+  </p:clrMapOvr>
+  <p:timing>
+    <p:tnLst>
+      <p:par>
+        <p:cTn id="1" dur="indefinite" restart="never" nodeType="tmRoot">
+          <p:childTnLst>
+            <p:seq concurrent="1" nextAc="seek">
+              <p:cTn id="2" dur="indefinite" nodeType="mainSeq">
+                <p:childTnLst>
+                  <p:par>
+                    <p:cTn id="3" fill="hold">
+                      <p:stCondLst>
+                        <p:cond delay="indefinite"/>
+                      </p:stCondLst>
+                      <p:childTnLst>
+                        <p:par>
+                          <p:cTn id="4" fill="hold">
+                            <p:stCondLst>
+                              <p:cond delay="0"/>
+                            </p:stCondLst>
+                            <p:childTnLst>
+                              <p:par>
+                                <p:cTn id="5" presetID="1" presetClass="entr" presetSubtype="0" fill="hold" grpId="0" nodeType="clickEffect">
+                                  <p:stCondLst>
+                                    <p:cond delay="0"/>
+                                  </p:stCondLst>
+                                  <p:childTnLst>
+                                    <p:set>
+                                      <p:cBhvr>
+                                        <p:cTn id="6" dur="1" fill="hold">
+                                          <p:stCondLst>
+                                            <p:cond delay="0"/>
+                                          </p:stCondLst>
+                                        </p:cTn>
+                                        <p:tgtEl>
+                                          <p:spTgt spid="3">
+                                            <p:txEl>
+                                              <p:pRg st="0" end="0"/>
+                                            </p:txEl>
+                                          </p:spTgt>
+                                        </p:tgtEl>
+                                        <p:attrNameLst>
+                                          <p:attrName>style.visibility</p:attrName>
+                                        </p:attrNameLst>
+                                      </p:cBhvr>
+                                      <p:to>
+                                        <p:strVal val="visible"/>
+                                      </p:to>
+                                    </p:set>
+                                  </p:childTnLst>
+                                </p:cTn>
+                              </p:par>
+                            </p:childTnLst>
+                          </p:cTn>
+                        </p:par>
+                      </p:childTnLst>
+                    </p:cTn>
+                  </p:par>
+                  <p:par>
+                    <p:cTn id="7" fill="hold">
+                      <p:stCondLst>
+                        <p:cond delay="indefinite"/>
+                      </p:stCondLst>
+                      <p:childTnLst>
+                        <p:par>
+                          <p:cTn id="8" fill="hold">
+                            <p:stCondLst>
+                              <p:cond delay="0"/>
+                            </p:stCondLst>
+                            <p:childTnLst>
+                              <p:par>
+                                <p:cTn id="9" presetID="1" presetClass="entr" presetSubtype="0" fill="hold" grpId="0" nodeType="clickEffect">
+                                  <p:stCondLst>
+                                    <p:cond delay="0"/>
+                                  </p:stCondLst>
+                                  <p:childTnLst>
+                                    <p:set>
+                                      <p:cBhvr>
+                                        <p:cTn id="10" dur="1" fill="hold">
+                                          <p:stCondLst>
+                                            <p:cond delay="0"/>
+                                          </p:stCondLst>
+                                        </p:cTn>
+                                        <p:tgtEl>
+                                          <p:spTgt spid="3">
+                                            <p:txEl>
+                                              <p:pRg st="1" end="1"/>
+                                            </p:txEl>
+                                          </p:spTgt>
+                                        </p:tgtEl>
+                                        <p:attrNameLst>
+                                          <p:attrName>style.visibility</p:attrName>
+                                        </p:attrNameLst>
+                                      </p:cBhvr>
+                                      <p:to>
+                                        <p:strVal val="visible"/>
+                                      </p:to>
+                                    </p:set>
+                                  </p:childTnLst>
+                                </p:cTn>
+                              </p:par>
+                            </p:childTnLst>
+                          </p:cTn>
+                        </p:par>
+                      </p:childTnLst>
+                    </p:cTn>
+                  </p:par>
+                  <p:par>
+                    <p:cTn id="11" fill="hold">
+                      <p:stCondLst>
+                        <p:cond delay="indefinite"/>
+                      </p:stCondLst>
+                      <p:childTnLst>
+                        <p:par>
+                          <p:cTn id="12" fill="hold">
+                            <p:stCondLst>
+                              <p:cond delay="0"/>
+                            </p:stCondLst>
+                            <p:childTnLst>
+                              <p:par>
+                                <p:cTn id="13" presetID="1" presetClass="entr" presetSubtype="0" fill="hold" grpId="0" nodeType="clickEffect">
+                                  <p:stCondLst>
+                                    <p:cond delay="0"/>
+                                  </p:stCondLst>
+                                  <p:childTnLst>
+                                    <p:set>
+                                      <p:cBhvr>
+                                        <p:cTn id="14" dur="1" fill="hold">
+                                          <p:stCondLst>
+                                            <p:cond delay="0"/>
+                                          </p:stCondLst>
+                                        </p:cTn>
+                                        <p:tgtEl>
+                                          <p:spTgt spid="3">
+                                            <p:txEl>
+                                              <p:pRg st="2" end="2"/>
+                                            </p:txEl>
+                                          </p:spTgt>
+                                        </p:tgtEl>
+                                        <p:attrNameLst>
+                                          <p:attrName>style.visibility</p:attrName>
+                                        </p:attrNameLst>
+                                      </p:cBhvr>
+                                      <p:to>
+                                        <p:strVal val="visible"/>
+                                      </p:to>
+                                    </p:set>
+                                  </p:childTnLst>
+                                </p:cTn>
+                              </p:par>
+                            </p:childTnLst>
+                          </p:cTn>
+                        </p:par>
+                      </p:childTnLst>
+                    </p:cTn>
+                  </p:par>
+                  <p:par>
+                    <p:cTn id="15" fill="hold">
+                      <p:stCondLst>
+                        <p:cond delay="indefinite"/>
+                      </p:stCondLst>
+                      <p:childTnLst>
+                        <p:par>
+                          <p:cTn id="16" fill="hold">
+                            <p:stCondLst>
+                              <p:cond delay="0"/>
+                            </p:stCondLst>
+                            <p:childTnLst>
+                              <p:par>
+                                <p:cTn id="17" presetID="1" presetClass="entr" presetSubtype="0" fill="hold" grpId="0" nodeType="clickEffect">
+                                  <p:stCondLst>
+                                    <p:cond delay="0"/>
+                                  </p:stCondLst>
+                                  <p:childTnLst>
+                                    <p:set>
+                                      <p:cBhvr>
+                                        <p:cTn id="18" dur="1" fill="hold">
+                                          <p:stCondLst>
+                                            <p:cond delay="0"/>
+                                          </p:stCondLst>
+                                        </p:cTn>
+                                        <p:tgtEl>
+                                          <p:spTgt spid="3">
+                                            <p:txEl>
+                                              <p:pRg st="3" end="3"/>
+                                            </p:txEl>
+                                          </p:spTgt>
+                                        </p:tgtEl>
+                                        <p:attrNameLst>
+                                          <p:attrName>style.visibility</p:attrName>
+                                        </p:attrNameLst>
+                                      </p:cBhvr>
+                                      <p:to>
+                                        <p:strVal val="visible"/>
+                                      </p:to>
+                                    </p:set>
+                                  </p:childTnLst>
+                                </p:cTn>
+                              </p:par>
+                            </p:childTnLst>
+                          </p:cTn>
+                        </p:par>
+                      </p:childTnLst>
+                    </p:cTn>
+                  </p:par>
+                </p:childTnLst>
+              </p:cTn>
+              <p:prevCondLst>
+                <p:cond evt="onPrev" delay="0">
+                  <p:tgtEl>
+                    <p:sldTgt/>
+                  </p:tgtEl>
+                </p:cond>
+              </p:prevCondLst>
+              <p:nextCondLst>
+                <p:cond evt="onNext" delay="0">
+                  <p:tgtEl>
+                    <p:sldTgt/>
+                  </p:tgtEl>
+                </p:cond>
+              </p:nextCondLst>
+            </p:seq>
+          </p:childTnLst>
+        </p:cTn>
+      </p:par>
+    </p:tnLst>
+    <p:bldLst>
+      <p:bldP spid="3" grpId="0" build="p"/>
+    </p:bldLst>
+  </p:timing>
+</p:sld>
+</file>
+
+<file path=ppt/slides/slide6.xml><?xml version="1.0" encoding="utf-8"?>
+<p:sld xmlns:a="http://schemas.openxmlformats.org/drawingml/2006/main" xmlns:r="http://schemas.openxmlformats.org/officeDocument/2006/relationships" xmlns:p="http://schemas.openxmlformats.org/presentationml/2006/main">
+  <p:cSld>
+    <p:spTree>
+      <p:nvGrpSpPr>
+        <p:cNvPr id="1" name=""/>
+        <p:cNvGrpSpPr/>
+        <p:nvPr/>
+      </p:nvGrpSpPr>
+      <p:grpSpPr>
+        <a:xfrm>
+          <a:off x="0" y="0"/>
+          <a:ext cx="0" cy="0"/>
+          <a:chOff x="0" y="0"/>
+          <a:chExt cx="0" cy="0"/>
+        </a:xfrm>
+      </p:grpSpPr>
+      <p:sp>
+        <p:nvSpPr>
+          <p:cNvPr id="2" name="Title 1"/>
+          <p:cNvSpPr>
+            <a:spLocks noGrp="1"/>
+          </p:cNvSpPr>
+          <p:nvPr>
+            <p:ph type="title"/>
+          </p:nvPr>
+        </p:nvSpPr>
+        <p:spPr/>
+        <p:txBody>
+          <a:bodyPr/>
+          <a:lstStyle/>
+          <a:p>
+            <a:r>
               <a:rPr lang="en-AU" dirty="0" smtClean="0"/>
               <a:t>Architecture</a:t>
             </a:r>
@@ -7199,107 +8622,6 @@
 </p:sld>
 </file>
 
-<file path=ppt/slides/slide6.xml><?xml version="1.0" encoding="utf-8"?>
-<p:sld xmlns:a="http://schemas.openxmlformats.org/drawingml/2006/main" xmlns:r="http://schemas.openxmlformats.org/officeDocument/2006/relationships" xmlns:p="http://schemas.openxmlformats.org/presentationml/2006/main">
-  <p:cSld>
-    <p:spTree>
-      <p:nvGrpSpPr>
-        <p:cNvPr id="1" name=""/>
-        <p:cNvGrpSpPr/>
-        <p:nvPr/>
-      </p:nvGrpSpPr>
-      <p:grpSpPr>
-        <a:xfrm>
-          <a:off x="0" y="0"/>
-          <a:ext cx="0" cy="0"/>
-          <a:chOff x="0" y="0"/>
-          <a:chExt cx="0" cy="0"/>
-        </a:xfrm>
-      </p:grpSpPr>
-      <p:sp>
-        <p:nvSpPr>
-          <p:cNvPr id="2" name="Title 1"/>
-          <p:cNvSpPr>
-            <a:spLocks noGrp="1"/>
-          </p:cNvSpPr>
-          <p:nvPr>
-            <p:ph type="title"/>
-          </p:nvPr>
-        </p:nvSpPr>
-        <p:spPr/>
-        <p:txBody>
-          <a:bodyPr/>
-          <a:lstStyle/>
-          <a:p>
-            <a:r>
-              <a:rPr lang="en-US" dirty="0" smtClean="0"/>
-              <a:t>Technologies for this demo</a:t>
-            </a:r>
-            <a:endParaRPr lang="en-AU" dirty="0"/>
-          </a:p>
-        </p:txBody>
-      </p:sp>
-      <p:sp>
-        <p:nvSpPr>
-          <p:cNvPr id="3" name="Content Placeholder 2"/>
-          <p:cNvSpPr>
-            <a:spLocks noGrp="1"/>
-          </p:cNvSpPr>
-          <p:nvPr>
-            <p:ph idx="1"/>
-          </p:nvPr>
-        </p:nvSpPr>
-        <p:spPr/>
-        <p:txBody>
-          <a:bodyPr/>
-          <a:lstStyle/>
-          <a:p>
-            <a:r>
-              <a:rPr lang="en-US" dirty="0" smtClean="0"/>
-              <a:t>Angular2 libs</a:t>
-            </a:r>
-          </a:p>
-          <a:p>
-            <a:r>
-              <a:rPr lang="en-US" dirty="0" smtClean="0"/>
-              <a:t>Typescript</a:t>
-            </a:r>
-          </a:p>
-          <a:p>
-            <a:r>
-              <a:rPr lang="en-US" dirty="0" smtClean="0"/>
-              <a:t>System.js</a:t>
-            </a:r>
-          </a:p>
-          <a:p>
-            <a:r>
-              <a:rPr lang="en-US" dirty="0" err="1" smtClean="0"/>
-              <a:t>RxJs</a:t>
-            </a:r>
-            <a:endParaRPr lang="en-AU" dirty="0"/>
-          </a:p>
-        </p:txBody>
-      </p:sp>
-    </p:spTree>
-    <p:extLst>
-      <p:ext uri="{BB962C8B-B14F-4D97-AF65-F5344CB8AC3E}">
-        <p14:creationId xmlns:p14="http://schemas.microsoft.com/office/powerpoint/2010/main" val="1477723824"/>
-      </p:ext>
-    </p:extLst>
-  </p:cSld>
-  <p:clrMapOvr>
-    <a:masterClrMapping/>
-  </p:clrMapOvr>
-  <p:timing>
-    <p:tnLst>
-      <p:par>
-        <p:cTn id="1" dur="indefinite" restart="never" nodeType="tmRoot"/>
-      </p:par>
-    </p:tnLst>
-  </p:timing>
-</p:sld>
-</file>
-
 <file path=ppt/slides/slide7.xml><?xml version="1.0" encoding="utf-8"?>
 <p:sld xmlns:a="http://schemas.openxmlformats.org/drawingml/2006/main" xmlns:r="http://schemas.openxmlformats.org/officeDocument/2006/relationships" xmlns:p="http://schemas.openxmlformats.org/presentationml/2006/main">
   <p:cSld>
@@ -7410,7 +8732,6 @@
               <a:rPr lang="en-AU" dirty="0" smtClean="0"/>
               <a:t> by conversion</a:t>
             </a:r>
-            <a:endParaRPr lang="en-AU" dirty="0" smtClean="0"/>
           </a:p>
           <a:p>
             <a:r>

</xml_diff>